<commit_message>
Updated ppt with proper name.
</commit_message>
<xml_diff>
--- a/Yahoo.pptx
+++ b/Yahoo.pptx
@@ -228,6 +228,11 @@
       </a:defRPr>
     </a:lvl9pPr>
   </p:defaultTextStyle>
+  <p:extLst>
+    <p:ext uri="{EFAFB233-063F-42B5-8137-9DF3F51BA10A}">
+      <p15:sldGuideLst xmlns:p15="http://schemas.microsoft.com/office/powerpoint/2012/main"/>
+    </p:ext>
+  </p:extLst>
 </p:presentation>
 </file>
 
@@ -19059,20 +19064,12 @@
               <a:buSzPct val="25000"/>
             </a:pPr>
             <a:r>
-              <a:rPr lang="en-US" sz="2000" b="1" dirty="0" err="1" smtClean="0">
-                <a:solidFill>
-                  <a:schemeClr val="bg1"/>
-                </a:solidFill>
-              </a:rPr>
-              <a:t>Rohit</a:t>
-            </a:r>
-            <a:r>
               <a:rPr lang="en-US" sz="2000" b="1" dirty="0" smtClean="0">
                 <a:solidFill>
                   <a:schemeClr val="bg1"/>
                 </a:solidFill>
               </a:rPr>
-              <a:t> </a:t>
+              <a:t>Rohit </a:t>
             </a:r>
             <a:r>
               <a:rPr lang="en-US" sz="2000" b="1" dirty="0" err="1">
@@ -19080,7 +19077,15 @@
                   <a:schemeClr val="bg1"/>
                 </a:solidFill>
               </a:rPr>
-              <a:t>Bobbilisetty</a:t>
+              <a:t>V</a:t>
+            </a:r>
+            <a:r>
+              <a:rPr lang="en-US" sz="2000" b="1" smtClean="0">
+                <a:solidFill>
+                  <a:schemeClr val="bg1"/>
+                </a:solidFill>
+              </a:rPr>
+              <a:t>obbilisetty</a:t>
             </a:r>
             <a:endParaRPr lang="en-US" sz="2000" b="1" i="0" u="none" strike="noStrike" cap="none" baseline="0" dirty="0">
               <a:solidFill>
@@ -19323,11 +19328,6 @@
               </a:rPr>
               <a:t>Algorithm</a:t>
             </a:r>
-            <a:endParaRPr lang="en-US" sz="4000" b="1" dirty="0">
-              <a:solidFill>
-                <a:schemeClr val="lt1"/>
-              </a:solidFill>
-            </a:endParaRPr>
           </a:p>
         </p:txBody>
       </p:sp>

</xml_diff>